<commit_message>
update pptx 8/10/2024 1st
</commit_message>
<xml_diff>
--- a/files/proposal.pptx
+++ b/files/proposal.pptx
@@ -14,8 +14,8 @@
     <p:sldId id="1910" r:id="rId5"/>
     <p:sldId id="1934" r:id="rId6"/>
     <p:sldId id="1933" r:id="rId7"/>
-    <p:sldId id="1919" r:id="rId8"/>
-    <p:sldId id="1927" r:id="rId9"/>
+    <p:sldId id="1927" r:id="rId8"/>
+    <p:sldId id="1919" r:id="rId9"/>
     <p:sldId id="1929" r:id="rId10"/>
     <p:sldId id="1928" r:id="rId11"/>
     <p:sldId id="1930" r:id="rId12"/>
@@ -1368,97 +1368,6 @@
   <p:cSld>
     <p:spTree>
       <p:nvGrpSpPr>
-        <p:cNvPr id="1" name=""/>
-        <p:cNvGrpSpPr/>
-        <p:nvPr/>
-      </p:nvGrpSpPr>
-      <p:grpSpPr>
-        <a:xfrm>
-          <a:off x="0" y="0"/>
-          <a:ext cx="0" cy="0"/>
-          <a:chOff x="0" y="0"/>
-          <a:chExt cx="0" cy="0"/>
-        </a:xfrm>
-      </p:grpSpPr>
-      <p:sp>
-        <p:nvSpPr>
-          <p:cNvPr id="2" name="幻灯片图像占位符 1"/>
-          <p:cNvSpPr>
-            <a:spLocks noGrp="1" noRot="1" noChangeAspect="1"/>
-          </p:cNvSpPr>
-          <p:nvPr>
-            <p:ph type="sldImg"/>
-          </p:nvPr>
-        </p:nvSpPr>
-        <p:spPr/>
-      </p:sp>
-      <p:sp>
-        <p:nvSpPr>
-          <p:cNvPr id="3" name="备注占位符 2"/>
-          <p:cNvSpPr>
-            <a:spLocks noGrp="1"/>
-          </p:cNvSpPr>
-          <p:nvPr>
-            <p:ph type="body" idx="1"/>
-          </p:nvPr>
-        </p:nvSpPr>
-        <p:spPr/>
-        <p:txBody>
-          <a:bodyPr/>
-          <a:lstStyle/>
-          <a:p>
-            <a:pPr algn="just"/>
-            <a:endParaRPr lang="en-US" altLang="zh-CN" b="0" i="0" dirty="0">
-              <a:solidFill>
-                <a:srgbClr val="333333"/>
-              </a:solidFill>
-              <a:effectLst/>
-              <a:latin typeface="Vollkorn"/>
-            </a:endParaRPr>
-          </a:p>
-        </p:txBody>
-      </p:sp>
-      <p:sp>
-        <p:nvSpPr>
-          <p:cNvPr id="4" name="灯片编号占位符 3"/>
-          <p:cNvSpPr>
-            <a:spLocks noGrp="1"/>
-          </p:cNvSpPr>
-          <p:nvPr>
-            <p:ph type="sldNum" sz="quarter" idx="5"/>
-          </p:nvPr>
-        </p:nvSpPr>
-        <p:spPr/>
-        <p:txBody>
-          <a:bodyPr/>
-          <a:lstStyle/>
-          <a:p>
-            <a:fld id="{F2ADDCEE-B938-4AE8-98CF-EB91900D4C25}" type="slidenum">
-              <a:rPr lang="zh-CN" altLang="en-US" smtClean="0"/>
-              <a:t>4</a:t>
-            </a:fld>
-            <a:endParaRPr lang="zh-CN" altLang="en-US"/>
-          </a:p>
-        </p:txBody>
-      </p:sp>
-    </p:spTree>
-    <p:extLst>
-      <p:ext uri="{BB962C8B-B14F-4D97-AF65-F5344CB8AC3E}">
-        <p14:creationId xmlns:p14="http://schemas.microsoft.com/office/powerpoint/2010/main" val="1658674312"/>
-      </p:ext>
-    </p:extLst>
-  </p:cSld>
-  <p:clrMapOvr>
-    <a:masterClrMapping/>
-  </p:clrMapOvr>
-</p:notes>
-</file>
-
-<file path=ppt/notesSlides/notesSlide5.xml><?xml version="1.0" encoding="utf-8"?>
-<p:notes xmlns:a="http://schemas.openxmlformats.org/drawingml/2006/main" xmlns:r="http://schemas.openxmlformats.org/officeDocument/2006/relationships" xmlns:p="http://schemas.openxmlformats.org/presentationml/2006/main">
-  <p:cSld>
-    <p:spTree>
-      <p:nvGrpSpPr>
         <p:cNvPr id="1" name="">
           <a:extLst>
             <a:ext uri="{FF2B5EF4-FFF2-40B4-BE49-F238E27FC236}">
@@ -1550,6 +1459,97 @@
           <a:p>
             <a:fld id="{F2ADDCEE-B938-4AE8-98CF-EB91900D4C25}" type="slidenum">
               <a:rPr lang="zh-CN" altLang="en-US" smtClean="0"/>
+              <a:t>4</a:t>
+            </a:fld>
+            <a:endParaRPr lang="zh-CN" altLang="en-US"/>
+          </a:p>
+        </p:txBody>
+      </p:sp>
+    </p:spTree>
+    <p:extLst>
+      <p:ext uri="{BB962C8B-B14F-4D97-AF65-F5344CB8AC3E}">
+        <p14:creationId xmlns:p14="http://schemas.microsoft.com/office/powerpoint/2010/main" val="1211735100"/>
+      </p:ext>
+    </p:extLst>
+  </p:cSld>
+  <p:clrMapOvr>
+    <a:masterClrMapping/>
+  </p:clrMapOvr>
+</p:notes>
+</file>
+
+<file path=ppt/notesSlides/notesSlide5.xml><?xml version="1.0" encoding="utf-8"?>
+<p:notes xmlns:a="http://schemas.openxmlformats.org/drawingml/2006/main" xmlns:r="http://schemas.openxmlformats.org/officeDocument/2006/relationships" xmlns:p="http://schemas.openxmlformats.org/presentationml/2006/main">
+  <p:cSld>
+    <p:spTree>
+      <p:nvGrpSpPr>
+        <p:cNvPr id="1" name=""/>
+        <p:cNvGrpSpPr/>
+        <p:nvPr/>
+      </p:nvGrpSpPr>
+      <p:grpSpPr>
+        <a:xfrm>
+          <a:off x="0" y="0"/>
+          <a:ext cx="0" cy="0"/>
+          <a:chOff x="0" y="0"/>
+          <a:chExt cx="0" cy="0"/>
+        </a:xfrm>
+      </p:grpSpPr>
+      <p:sp>
+        <p:nvSpPr>
+          <p:cNvPr id="2" name="幻灯片图像占位符 1"/>
+          <p:cNvSpPr>
+            <a:spLocks noGrp="1" noRot="1" noChangeAspect="1"/>
+          </p:cNvSpPr>
+          <p:nvPr>
+            <p:ph type="sldImg"/>
+          </p:nvPr>
+        </p:nvSpPr>
+        <p:spPr/>
+      </p:sp>
+      <p:sp>
+        <p:nvSpPr>
+          <p:cNvPr id="3" name="备注占位符 2"/>
+          <p:cNvSpPr>
+            <a:spLocks noGrp="1"/>
+          </p:cNvSpPr>
+          <p:nvPr>
+            <p:ph type="body" idx="1"/>
+          </p:nvPr>
+        </p:nvSpPr>
+        <p:spPr/>
+        <p:txBody>
+          <a:bodyPr/>
+          <a:lstStyle/>
+          <a:p>
+            <a:pPr algn="just"/>
+            <a:endParaRPr lang="en-US" altLang="zh-CN" b="0" i="0" dirty="0">
+              <a:solidFill>
+                <a:srgbClr val="333333"/>
+              </a:solidFill>
+              <a:effectLst/>
+              <a:latin typeface="Vollkorn"/>
+            </a:endParaRPr>
+          </a:p>
+        </p:txBody>
+      </p:sp>
+      <p:sp>
+        <p:nvSpPr>
+          <p:cNvPr id="4" name="灯片编号占位符 3"/>
+          <p:cNvSpPr>
+            <a:spLocks noGrp="1"/>
+          </p:cNvSpPr>
+          <p:nvPr>
+            <p:ph type="sldNum" sz="quarter" idx="5"/>
+          </p:nvPr>
+        </p:nvSpPr>
+        <p:spPr/>
+        <p:txBody>
+          <a:bodyPr/>
+          <a:lstStyle/>
+          <a:p>
+            <a:fld id="{F2ADDCEE-B938-4AE8-98CF-EB91900D4C25}" type="slidenum">
+              <a:rPr lang="zh-CN" altLang="en-US" smtClean="0"/>
               <a:t>5</a:t>
             </a:fld>
             <a:endParaRPr lang="zh-CN" altLang="en-US"/>
@@ -1559,7 +1559,7 @@
     </p:spTree>
     <p:extLst>
       <p:ext uri="{BB962C8B-B14F-4D97-AF65-F5344CB8AC3E}">
-        <p14:creationId xmlns:p14="http://schemas.microsoft.com/office/powerpoint/2010/main" val="1211735100"/>
+        <p14:creationId xmlns:p14="http://schemas.microsoft.com/office/powerpoint/2010/main" val="1658674312"/>
       </p:ext>
     </p:extLst>
   </p:cSld>
@@ -9717,7 +9717,13 @@
   <p:cSld>
     <p:spTree>
       <p:nvGrpSpPr>
-        <p:cNvPr id="1" name=""/>
+        <p:cNvPr id="1" name="">
+          <a:extLst>
+            <a:ext uri="{FF2B5EF4-FFF2-40B4-BE49-F238E27FC236}">
+              <a16:creationId xmlns:a16="http://schemas.microsoft.com/office/drawing/2014/main" id="{1613561F-03FE-7B80-EE20-0E5A43B61508}"/>
+            </a:ext>
+          </a:extLst>
+        </p:cNvPr>
         <p:cNvGrpSpPr/>
         <p:nvPr/>
       </p:nvGrpSpPr>
@@ -9734,7 +9740,7 @@
           <p:cNvPr id="5" name="圆角矩形 16">
             <a:extLst>
               <a:ext uri="{FF2B5EF4-FFF2-40B4-BE49-F238E27FC236}">
-                <a16:creationId xmlns:a16="http://schemas.microsoft.com/office/drawing/2014/main" id="{EEC9B5A3-C3D1-657F-10E8-C2215F5C0F4B}"/>
+                <a16:creationId xmlns:a16="http://schemas.microsoft.com/office/drawing/2014/main" id="{E2E2F4C9-5564-F28D-30AA-511154A672DA}"/>
               </a:ext>
             </a:extLst>
           </p:cNvPr>
@@ -9744,7 +9750,7 @@
         <p:spPr>
           <a:xfrm>
             <a:off x="623393" y="425542"/>
-            <a:ext cx="8928991" cy="525597"/>
+            <a:ext cx="10801199" cy="525597"/>
           </a:xfrm>
           <a:prstGeom prst="roundRect">
             <a:avLst>
@@ -9798,7 +9804,458 @@
                 <a:ea typeface="+mj-ea"/>
                 <a:cs typeface="Arial" panose="020B0604020202020204" pitchFamily="34" charset="0"/>
               </a:rPr>
-              <a:t>The Limitations of a Purely Vision-Based Solution</a:t>
+              <a:t>Limitations of Vision and LiDAR</a:t>
+            </a:r>
+            <a:r>
+              <a:rPr lang="zh-CN" altLang="en-US" sz="2800" dirty="0">
+                <a:solidFill>
+                  <a:schemeClr val="tx2"/>
+                </a:solidFill>
+                <a:latin typeface="Arial" panose="020B0604020202020204" pitchFamily="34" charset="0"/>
+                <a:ea typeface="+mj-ea"/>
+                <a:cs typeface="Arial" panose="020B0604020202020204" pitchFamily="34" charset="0"/>
+              </a:rPr>
+              <a:t> </a:t>
+            </a:r>
+            <a:r>
+              <a:rPr lang="en-US" sz="2800" dirty="0">
+                <a:solidFill>
+                  <a:schemeClr val="tx2"/>
+                </a:solidFill>
+                <a:latin typeface="Arial" panose="020B0604020202020204" pitchFamily="34" charset="0"/>
+                <a:ea typeface="+mj-ea"/>
+                <a:cs typeface="Arial" panose="020B0604020202020204" pitchFamily="34" charset="0"/>
+              </a:rPr>
+              <a:t>Solution for Depth Estimation</a:t>
+            </a:r>
+            <a:r>
+              <a:rPr lang="en-US" altLang="zh-CN" sz="2800" dirty="0">
+                <a:solidFill>
+                  <a:schemeClr val="tx2"/>
+                </a:solidFill>
+                <a:latin typeface="Arial" panose="020B0604020202020204" pitchFamily="34" charset="0"/>
+                <a:ea typeface="+mj-ea"/>
+                <a:cs typeface="Arial" panose="020B0604020202020204" pitchFamily="34" charset="0"/>
+              </a:rPr>
+              <a:t> </a:t>
+            </a:r>
+          </a:p>
+        </p:txBody>
+      </p:sp>
+      <p:sp>
+        <p:nvSpPr>
+          <p:cNvPr id="6" name="任意多边形 25">
+            <a:extLst>
+              <a:ext uri="{FF2B5EF4-FFF2-40B4-BE49-F238E27FC236}">
+                <a16:creationId xmlns:a16="http://schemas.microsoft.com/office/drawing/2014/main" id="{0F13382F-5C37-A910-7643-54C1948FD7AB}"/>
+              </a:ext>
+            </a:extLst>
+          </p:cNvPr>
+          <p:cNvSpPr/>
+          <p:nvPr/>
+        </p:nvSpPr>
+        <p:spPr>
+          <a:xfrm>
+            <a:off x="623393" y="425541"/>
+            <a:ext cx="720079" cy="525598"/>
+          </a:xfrm>
+          <a:custGeom>
+            <a:avLst/>
+            <a:gdLst>
+              <a:gd name="connsiteX0" fmla="*/ 0 w 615007"/>
+              <a:gd name="connsiteY0" fmla="*/ 0 h 525598"/>
+              <a:gd name="connsiteX1" fmla="*/ 352208 w 615007"/>
+              <a:gd name="connsiteY1" fmla="*/ 0 h 525598"/>
+              <a:gd name="connsiteX2" fmla="*/ 615007 w 615007"/>
+              <a:gd name="connsiteY2" fmla="*/ 262799 h 525598"/>
+              <a:gd name="connsiteX3" fmla="*/ 615006 w 615007"/>
+              <a:gd name="connsiteY3" fmla="*/ 262799 h 525598"/>
+              <a:gd name="connsiteX4" fmla="*/ 352207 w 615007"/>
+              <a:gd name="connsiteY4" fmla="*/ 525598 h 525598"/>
+              <a:gd name="connsiteX5" fmla="*/ 0 w 615007"/>
+              <a:gd name="connsiteY5" fmla="*/ 525598 h 525598"/>
+              <a:gd name="connsiteX6" fmla="*/ 0 w 615007"/>
+              <a:gd name="connsiteY6" fmla="*/ 0 h 525598"/>
+            </a:gdLst>
+            <a:ahLst/>
+            <a:cxnLst>
+              <a:cxn ang="0">
+                <a:pos x="connsiteX0" y="connsiteY0"/>
+              </a:cxn>
+              <a:cxn ang="0">
+                <a:pos x="connsiteX1" y="connsiteY1"/>
+              </a:cxn>
+              <a:cxn ang="0">
+                <a:pos x="connsiteX2" y="connsiteY2"/>
+              </a:cxn>
+              <a:cxn ang="0">
+                <a:pos x="connsiteX3" y="connsiteY3"/>
+              </a:cxn>
+              <a:cxn ang="0">
+                <a:pos x="connsiteX4" y="connsiteY4"/>
+              </a:cxn>
+              <a:cxn ang="0">
+                <a:pos x="connsiteX5" y="connsiteY5"/>
+              </a:cxn>
+              <a:cxn ang="0">
+                <a:pos x="connsiteX6" y="connsiteY6"/>
+              </a:cxn>
+            </a:cxnLst>
+            <a:rect l="l" t="t" r="r" b="b"/>
+            <a:pathLst>
+              <a:path w="615007" h="525598">
+                <a:moveTo>
+                  <a:pt x="0" y="0"/>
+                </a:moveTo>
+                <a:lnTo>
+                  <a:pt x="352208" y="0"/>
+                </a:lnTo>
+                <a:cubicBezTo>
+                  <a:pt x="497348" y="0"/>
+                  <a:pt x="615007" y="117659"/>
+                  <a:pt x="615007" y="262799"/>
+                </a:cubicBezTo>
+                <a:lnTo>
+                  <a:pt x="615006" y="262799"/>
+                </a:lnTo>
+                <a:cubicBezTo>
+                  <a:pt x="615006" y="407939"/>
+                  <a:pt x="497347" y="525598"/>
+                  <a:pt x="352207" y="525598"/>
+                </a:cubicBezTo>
+                <a:lnTo>
+                  <a:pt x="0" y="525598"/>
+                </a:lnTo>
+                <a:lnTo>
+                  <a:pt x="0" y="0"/>
+                </a:lnTo>
+                <a:close/>
+              </a:path>
+            </a:pathLst>
+          </a:custGeom>
+          <a:solidFill>
+            <a:schemeClr val="accent6">
+              <a:lumMod val="50000"/>
+            </a:schemeClr>
+          </a:solidFill>
+          <a:ln>
+            <a:noFill/>
+          </a:ln>
+        </p:spPr>
+        <p:style>
+          <a:lnRef idx="2">
+            <a:schemeClr val="accent1">
+              <a:shade val="50000"/>
+            </a:schemeClr>
+          </a:lnRef>
+          <a:fillRef idx="1">
+            <a:schemeClr val="accent1"/>
+          </a:fillRef>
+          <a:effectRef idx="0">
+            <a:schemeClr val="accent1"/>
+          </a:effectRef>
+          <a:fontRef idx="minor">
+            <a:schemeClr val="lt1"/>
+          </a:fontRef>
+        </p:style>
+        <p:txBody>
+          <a:bodyPr rtlCol="0" anchor="ctr"/>
+          <a:lstStyle/>
+          <a:p>
+            <a:pPr algn="ctr"/>
+            <a:r>
+              <a:rPr lang="en-US" altLang="zh-CN" sz="2800" dirty="0">
+                <a:latin typeface="+mj-lt"/>
+              </a:rPr>
+              <a:t>1.2</a:t>
+            </a:r>
+            <a:endParaRPr lang="zh-CN" altLang="en-US" sz="2800" dirty="0">
+              <a:latin typeface="+mj-lt"/>
+            </a:endParaRPr>
+          </a:p>
+        </p:txBody>
+      </p:sp>
+      <p:sp>
+        <p:nvSpPr>
+          <p:cNvPr id="2" name="文本框 1">
+            <a:extLst>
+              <a:ext uri="{FF2B5EF4-FFF2-40B4-BE49-F238E27FC236}">
+                <a16:creationId xmlns:a16="http://schemas.microsoft.com/office/drawing/2014/main" id="{662425AF-3094-189E-1C87-190D5042D842}"/>
+              </a:ext>
+            </a:extLst>
+          </p:cNvPr>
+          <p:cNvSpPr txBox="1"/>
+          <p:nvPr/>
+        </p:nvSpPr>
+        <p:spPr>
+          <a:xfrm>
+            <a:off x="11656913" y="6381328"/>
+            <a:ext cx="288032" cy="369332"/>
+          </a:xfrm>
+          <a:prstGeom prst="rect">
+            <a:avLst/>
+          </a:prstGeom>
+          <a:noFill/>
+        </p:spPr>
+        <p:txBody>
+          <a:bodyPr wrap="square">
+            <a:spAutoFit/>
+          </a:bodyPr>
+          <a:lstStyle/>
+          <a:p>
+            <a:r>
+              <a:rPr lang="en-US" altLang="zh-CN" dirty="0">
+                <a:solidFill>
+                  <a:srgbClr val="1F0909"/>
+                </a:solidFill>
+                <a:latin typeface="PT Serif" panose="020A0603040505020204" pitchFamily="18" charset="0"/>
+              </a:rPr>
+              <a:t>4</a:t>
+            </a:r>
+            <a:endParaRPr lang="zh-CN" altLang="en-US" dirty="0"/>
+          </a:p>
+        </p:txBody>
+      </p:sp>
+      <p:sp>
+        <p:nvSpPr>
+          <p:cNvPr id="8" name="文本框 2">
+            <a:extLst>
+              <a:ext uri="{FF2B5EF4-FFF2-40B4-BE49-F238E27FC236}">
+                <a16:creationId xmlns:a16="http://schemas.microsoft.com/office/drawing/2014/main" id="{1E2A547F-D3C9-DAFB-CBD2-7AF89D434F9B}"/>
+              </a:ext>
+            </a:extLst>
+          </p:cNvPr>
+          <p:cNvSpPr txBox="1"/>
+          <p:nvPr/>
+        </p:nvSpPr>
+        <p:spPr>
+          <a:xfrm>
+            <a:off x="1199456" y="1124744"/>
+            <a:ext cx="10081120" cy="3780458"/>
+          </a:xfrm>
+          <a:prstGeom prst="rect">
+            <a:avLst/>
+          </a:prstGeom>
+          <a:noFill/>
+        </p:spPr>
+        <p:txBody>
+          <a:bodyPr wrap="square">
+            <a:spAutoFit/>
+          </a:bodyPr>
+          <a:lstStyle/>
+          <a:p>
+            <a:pPr marL="285750" indent="-285750">
+              <a:lnSpc>
+                <a:spcPct val="150000"/>
+              </a:lnSpc>
+              <a:buFont typeface="Wingdings" panose="05000000000000000000" pitchFamily="2" charset="2"/>
+              <a:buChar char="l"/>
+            </a:pPr>
+            <a:r>
+              <a:rPr lang="en-US" altLang="zh-CN" spc="100" dirty="0">
+                <a:latin typeface="Arial" panose="020B0604020202020204" pitchFamily="34" charset="0"/>
+                <a:cs typeface="Arial" panose="020B0604020202020204" pitchFamily="34" charset="0"/>
+              </a:rPr>
+              <a:t>High cost:</a:t>
+            </a:r>
+          </a:p>
+          <a:p>
+            <a:pPr marL="742950" lvl="1" indent="-285750">
+              <a:lnSpc>
+                <a:spcPct val="150000"/>
+              </a:lnSpc>
+              <a:buFont typeface="Century Gothic" panose="020B0502020202020204" pitchFamily="34" charset="0"/>
+              <a:buChar char="○"/>
+            </a:pPr>
+            <a:r>
+              <a:rPr lang="en-US" altLang="zh-CN" spc="100" dirty="0">
+                <a:latin typeface="Arial" panose="020B0604020202020204" pitchFamily="34" charset="0"/>
+                <a:ea typeface="Open Sans Light" panose="020B0306030504020204" pitchFamily="34" charset="0"/>
+                <a:cs typeface="Arial" panose="020B0604020202020204" pitchFamily="34" charset="0"/>
+              </a:rPr>
+              <a:t>LiDAR sensors are expensive, particularly high-precision systems, making large-scale commercial deployment a significant economic barrier</a:t>
+            </a:r>
+          </a:p>
+          <a:p>
+            <a:pPr marL="285750" indent="-285750">
+              <a:lnSpc>
+                <a:spcPct val="150000"/>
+              </a:lnSpc>
+              <a:buFont typeface="Wingdings" panose="05000000000000000000" pitchFamily="2" charset="2"/>
+              <a:buChar char="l"/>
+            </a:pPr>
+            <a:r>
+              <a:rPr lang="en-US" altLang="zh-CN" spc="100" dirty="0">
+                <a:latin typeface="Arial" panose="020B0604020202020204" pitchFamily="34" charset="0"/>
+                <a:cs typeface="Arial" panose="020B0604020202020204" pitchFamily="34" charset="0"/>
+              </a:rPr>
+              <a:t>Weather sensitivity</a:t>
+            </a:r>
+          </a:p>
+          <a:p>
+            <a:pPr marL="742950" lvl="1" indent="-285750">
+              <a:lnSpc>
+                <a:spcPct val="150000"/>
+              </a:lnSpc>
+              <a:buFont typeface="Century Gothic" panose="020B0502020202020204" pitchFamily="34" charset="0"/>
+              <a:buChar char="○"/>
+            </a:pPr>
+            <a:r>
+              <a:rPr lang="en-US" altLang="zh-CN" spc="100" dirty="0">
+                <a:latin typeface="Arial" panose="020B0604020202020204" pitchFamily="34" charset="0"/>
+                <a:ea typeface="Open Sans Light" panose="020B0306030504020204" pitchFamily="34" charset="0"/>
+                <a:cs typeface="Arial" panose="020B0604020202020204" pitchFamily="34" charset="0"/>
+              </a:rPr>
+              <a:t>LiDAR is vulnerable to extreme weather conditions (e.g., heavy rain, fog, snow), where laser signals may scatter or reflect, leading to unreliable perception data.</a:t>
+            </a:r>
+          </a:p>
+          <a:p>
+            <a:pPr marL="285750" indent="-285750">
+              <a:lnSpc>
+                <a:spcPct val="150000"/>
+              </a:lnSpc>
+              <a:buFont typeface="Wingdings" panose="05000000000000000000" pitchFamily="2" charset="2"/>
+              <a:buChar char="l"/>
+            </a:pPr>
+            <a:r>
+              <a:rPr lang="en-US" spc="100" dirty="0">
+                <a:latin typeface="Arial" panose="020B0604020202020204" pitchFamily="34" charset="0"/>
+                <a:cs typeface="Arial" panose="020B0604020202020204" pitchFamily="34" charset="0"/>
+              </a:rPr>
+              <a:t>Sensor alignment:</a:t>
+            </a:r>
+          </a:p>
+          <a:p>
+            <a:pPr marL="742950" lvl="1" indent="-285750">
+              <a:lnSpc>
+                <a:spcPct val="150000"/>
+              </a:lnSpc>
+              <a:buFont typeface="Century Gothic" panose="020B0502020202020204" pitchFamily="34" charset="0"/>
+              <a:buChar char="○"/>
+            </a:pPr>
+            <a:r>
+              <a:rPr lang="en-US" spc="100" dirty="0">
+                <a:latin typeface="Arial" panose="020B0604020202020204" pitchFamily="34" charset="0"/>
+                <a:ea typeface="Open Sans Light" panose="020B0306030504020204" pitchFamily="34" charset="0"/>
+                <a:cs typeface="Arial" panose="020B0604020202020204" pitchFamily="34" charset="0"/>
+              </a:rPr>
+              <a:t>Precise alignment for LiDAR and camera data is required, including time and spatial calibration.</a:t>
+            </a:r>
+          </a:p>
+        </p:txBody>
+      </p:sp>
+    </p:spTree>
+    <p:extLst>
+      <p:ext uri="{BB962C8B-B14F-4D97-AF65-F5344CB8AC3E}">
+        <p14:creationId xmlns:p14="http://schemas.microsoft.com/office/powerpoint/2010/main" val="832628322"/>
+      </p:ext>
+    </p:extLst>
+  </p:cSld>
+  <p:clrMapOvr>
+    <a:masterClrMapping/>
+  </p:clrMapOvr>
+  <mc:AlternateContent xmlns:mc="http://schemas.openxmlformats.org/markup-compatibility/2006" xmlns:p159="http://schemas.microsoft.com/office/powerpoint/2015/09/main">
+    <mc:Choice Requires="p159">
+      <p:transition>
+        <p159:morph option="byObject"/>
+      </p:transition>
+    </mc:Choice>
+    <mc:Fallback xmlns="">
+      <p:transition>
+        <p:fade/>
+      </p:transition>
+    </mc:Fallback>
+  </mc:AlternateContent>
+</p:sld>
+</file>
+
+<file path=ppt/slides/slide5.xml><?xml version="1.0" encoding="utf-8"?>
+<p:sld xmlns:a="http://schemas.openxmlformats.org/drawingml/2006/main" xmlns:r="http://schemas.openxmlformats.org/officeDocument/2006/relationships" xmlns:p="http://schemas.openxmlformats.org/presentationml/2006/main">
+  <p:cSld>
+    <p:spTree>
+      <p:nvGrpSpPr>
+        <p:cNvPr id="1" name=""/>
+        <p:cNvGrpSpPr/>
+        <p:nvPr/>
+      </p:nvGrpSpPr>
+      <p:grpSpPr>
+        <a:xfrm>
+          <a:off x="0" y="0"/>
+          <a:ext cx="0" cy="0"/>
+          <a:chOff x="0" y="0"/>
+          <a:chExt cx="0" cy="0"/>
+        </a:xfrm>
+      </p:grpSpPr>
+      <p:sp>
+        <p:nvSpPr>
+          <p:cNvPr id="5" name="圆角矩形 16">
+            <a:extLst>
+              <a:ext uri="{FF2B5EF4-FFF2-40B4-BE49-F238E27FC236}">
+                <a16:creationId xmlns:a16="http://schemas.microsoft.com/office/drawing/2014/main" id="{EEC9B5A3-C3D1-657F-10E8-C2215F5C0F4B}"/>
+              </a:ext>
+            </a:extLst>
+          </p:cNvPr>
+          <p:cNvSpPr/>
+          <p:nvPr/>
+        </p:nvSpPr>
+        <p:spPr>
+          <a:xfrm>
+            <a:off x="623394" y="425542"/>
+            <a:ext cx="10945214" cy="525597"/>
+          </a:xfrm>
+          <a:prstGeom prst="roundRect">
+            <a:avLst>
+              <a:gd name="adj" fmla="val 50000"/>
+            </a:avLst>
+          </a:prstGeom>
+          <a:solidFill>
+            <a:srgbClr val="E3E5E7"/>
+          </a:solidFill>
+          <a:ln>
+            <a:noFill/>
+          </a:ln>
+        </p:spPr>
+        <p:style>
+          <a:lnRef idx="2">
+            <a:schemeClr val="accent1">
+              <a:shade val="50000"/>
+            </a:schemeClr>
+          </a:lnRef>
+          <a:fillRef idx="1">
+            <a:schemeClr val="accent1"/>
+          </a:fillRef>
+          <a:effectRef idx="0">
+            <a:schemeClr val="accent1"/>
+          </a:effectRef>
+          <a:fontRef idx="minor">
+            <a:schemeClr val="lt1"/>
+          </a:fontRef>
+        </p:style>
+        <p:txBody>
+          <a:bodyPr rtlCol="0" anchor="ctr"/>
+          <a:lstStyle/>
+          <a:p>
+            <a:r>
+              <a:rPr lang="zh-CN" altLang="en-US" sz="2800" dirty="0">
+                <a:solidFill>
+                  <a:schemeClr val="tx2"/>
+                </a:solidFill>
+                <a:latin typeface="Arial" panose="020B0604020202020204" pitchFamily="34" charset="0"/>
+                <a:ea typeface="+mj-ea"/>
+                <a:cs typeface="Arial" panose="020B0604020202020204" pitchFamily="34" charset="0"/>
+              </a:rPr>
+              <a:t>       </a:t>
+            </a:r>
+            <a:r>
+              <a:rPr lang="en-US" sz="2800" dirty="0">
+                <a:solidFill>
+                  <a:schemeClr val="tx2"/>
+                </a:solidFill>
+                <a:latin typeface="Arial" panose="020B0604020202020204" pitchFamily="34" charset="0"/>
+                <a:ea typeface="+mj-ea"/>
+                <a:cs typeface="Arial" panose="020B0604020202020204" pitchFamily="34" charset="0"/>
+              </a:rPr>
+              <a:t>The Limitations of Vision-Based Solution for Depth Estimation</a:t>
             </a:r>
             <a:r>
               <a:rPr lang="en-US" altLang="zh-CN" sz="2800" dirty="0">
@@ -9939,7 +10396,7 @@
               <a:rPr lang="en-US" altLang="zh-CN" sz="2800" dirty="0">
                 <a:latin typeface="+mj-lt"/>
               </a:rPr>
-              <a:t>1.2</a:t>
+              <a:t>1.3</a:t>
             </a:r>
             <a:endParaRPr lang="zh-CN" altLang="en-US" sz="2800" dirty="0">
               <a:latin typeface="+mj-lt"/>
@@ -9982,7 +10439,7 @@
                 </a:solidFill>
                 <a:latin typeface="PT Serif" panose="020A0603040505020204" pitchFamily="18" charset="0"/>
               </a:rPr>
-              <a:t>4</a:t>
+              <a:t>5</a:t>
             </a:r>
             <a:endParaRPr lang="zh-CN" altLang="en-US" dirty="0"/>
           </a:p>
@@ -10165,519 +10622,6 @@
     <p:extLst>
       <p:ext uri="{BB962C8B-B14F-4D97-AF65-F5344CB8AC3E}">
         <p14:creationId xmlns:p14="http://schemas.microsoft.com/office/powerpoint/2010/main" val="318843254"/>
-      </p:ext>
-    </p:extLst>
-  </p:cSld>
-  <p:clrMapOvr>
-    <a:masterClrMapping/>
-  </p:clrMapOvr>
-  <mc:AlternateContent xmlns:mc="http://schemas.openxmlformats.org/markup-compatibility/2006" xmlns:p159="http://schemas.microsoft.com/office/powerpoint/2015/09/main">
-    <mc:Choice Requires="p159">
-      <p:transition>
-        <p159:morph option="byObject"/>
-      </p:transition>
-    </mc:Choice>
-    <mc:Fallback xmlns="">
-      <p:transition>
-        <p:fade/>
-      </p:transition>
-    </mc:Fallback>
-  </mc:AlternateContent>
-</p:sld>
-</file>
-
-<file path=ppt/slides/slide5.xml><?xml version="1.0" encoding="utf-8"?>
-<p:sld xmlns:a="http://schemas.openxmlformats.org/drawingml/2006/main" xmlns:r="http://schemas.openxmlformats.org/officeDocument/2006/relationships" xmlns:p="http://schemas.openxmlformats.org/presentationml/2006/main">
-  <p:cSld>
-    <p:spTree>
-      <p:nvGrpSpPr>
-        <p:cNvPr id="1" name="">
-          <a:extLst>
-            <a:ext uri="{FF2B5EF4-FFF2-40B4-BE49-F238E27FC236}">
-              <a16:creationId xmlns:a16="http://schemas.microsoft.com/office/drawing/2014/main" id="{1613561F-03FE-7B80-EE20-0E5A43B61508}"/>
-            </a:ext>
-          </a:extLst>
-        </p:cNvPr>
-        <p:cNvGrpSpPr/>
-        <p:nvPr/>
-      </p:nvGrpSpPr>
-      <p:grpSpPr>
-        <a:xfrm>
-          <a:off x="0" y="0"/>
-          <a:ext cx="0" cy="0"/>
-          <a:chOff x="0" y="0"/>
-          <a:chExt cx="0" cy="0"/>
-        </a:xfrm>
-      </p:grpSpPr>
-      <p:sp>
-        <p:nvSpPr>
-          <p:cNvPr id="5" name="圆角矩形 16">
-            <a:extLst>
-              <a:ext uri="{FF2B5EF4-FFF2-40B4-BE49-F238E27FC236}">
-                <a16:creationId xmlns:a16="http://schemas.microsoft.com/office/drawing/2014/main" id="{E2E2F4C9-5564-F28D-30AA-511154A672DA}"/>
-              </a:ext>
-            </a:extLst>
-          </p:cNvPr>
-          <p:cNvSpPr/>
-          <p:nvPr/>
-        </p:nvSpPr>
-        <p:spPr>
-          <a:xfrm>
-            <a:off x="623393" y="425542"/>
-            <a:ext cx="9217023" cy="525597"/>
-          </a:xfrm>
-          <a:prstGeom prst="roundRect">
-            <a:avLst>
-              <a:gd name="adj" fmla="val 50000"/>
-            </a:avLst>
-          </a:prstGeom>
-          <a:solidFill>
-            <a:srgbClr val="E3E5E7"/>
-          </a:solidFill>
-          <a:ln>
-            <a:noFill/>
-          </a:ln>
-        </p:spPr>
-        <p:style>
-          <a:lnRef idx="2">
-            <a:schemeClr val="accent1">
-              <a:shade val="50000"/>
-            </a:schemeClr>
-          </a:lnRef>
-          <a:fillRef idx="1">
-            <a:schemeClr val="accent1"/>
-          </a:fillRef>
-          <a:effectRef idx="0">
-            <a:schemeClr val="accent1"/>
-          </a:effectRef>
-          <a:fontRef idx="minor">
-            <a:schemeClr val="lt1"/>
-          </a:fontRef>
-        </p:style>
-        <p:txBody>
-          <a:bodyPr rtlCol="0" anchor="ctr"/>
-          <a:lstStyle/>
-          <a:p>
-            <a:r>
-              <a:rPr lang="zh-CN" altLang="en-US" sz="2800" dirty="0">
-                <a:solidFill>
-                  <a:schemeClr val="tx2"/>
-                </a:solidFill>
-                <a:latin typeface="Arial" panose="020B0604020202020204" pitchFamily="34" charset="0"/>
-                <a:ea typeface="+mj-ea"/>
-                <a:cs typeface="Arial" panose="020B0604020202020204" pitchFamily="34" charset="0"/>
-              </a:rPr>
-              <a:t>       </a:t>
-            </a:r>
-            <a:r>
-              <a:rPr lang="en-US" sz="2800" dirty="0">
-                <a:solidFill>
-                  <a:schemeClr val="tx2"/>
-                </a:solidFill>
-                <a:latin typeface="Arial" panose="020B0604020202020204" pitchFamily="34" charset="0"/>
-                <a:ea typeface="+mj-ea"/>
-                <a:cs typeface="Arial" panose="020B0604020202020204" pitchFamily="34" charset="0"/>
-              </a:rPr>
-              <a:t>Limitations of combining Vision and LiDAR</a:t>
-            </a:r>
-            <a:r>
-              <a:rPr lang="zh-CN" altLang="en-US" sz="2800" dirty="0">
-                <a:solidFill>
-                  <a:schemeClr val="tx2"/>
-                </a:solidFill>
-                <a:latin typeface="Arial" panose="020B0604020202020204" pitchFamily="34" charset="0"/>
-                <a:ea typeface="+mj-ea"/>
-                <a:cs typeface="Arial" panose="020B0604020202020204" pitchFamily="34" charset="0"/>
-              </a:rPr>
-              <a:t> </a:t>
-            </a:r>
-            <a:r>
-              <a:rPr lang="en-US" sz="2800" dirty="0">
-                <a:solidFill>
-                  <a:schemeClr val="tx2"/>
-                </a:solidFill>
-                <a:latin typeface="Arial" panose="020B0604020202020204" pitchFamily="34" charset="0"/>
-                <a:ea typeface="+mj-ea"/>
-                <a:cs typeface="Arial" panose="020B0604020202020204" pitchFamily="34" charset="0"/>
-              </a:rPr>
-              <a:t>Solution</a:t>
-            </a:r>
-            <a:r>
-              <a:rPr lang="en-US" altLang="zh-CN" sz="2800" dirty="0">
-                <a:solidFill>
-                  <a:schemeClr val="tx2"/>
-                </a:solidFill>
-                <a:latin typeface="Arial" panose="020B0604020202020204" pitchFamily="34" charset="0"/>
-                <a:ea typeface="+mj-ea"/>
-                <a:cs typeface="Arial" panose="020B0604020202020204" pitchFamily="34" charset="0"/>
-              </a:rPr>
-              <a:t> </a:t>
-            </a:r>
-          </a:p>
-        </p:txBody>
-      </p:sp>
-      <p:sp>
-        <p:nvSpPr>
-          <p:cNvPr id="6" name="任意多边形 25">
-            <a:extLst>
-              <a:ext uri="{FF2B5EF4-FFF2-40B4-BE49-F238E27FC236}">
-                <a16:creationId xmlns:a16="http://schemas.microsoft.com/office/drawing/2014/main" id="{0F13382F-5C37-A910-7643-54C1948FD7AB}"/>
-              </a:ext>
-            </a:extLst>
-          </p:cNvPr>
-          <p:cNvSpPr/>
-          <p:nvPr/>
-        </p:nvSpPr>
-        <p:spPr>
-          <a:xfrm>
-            <a:off x="623393" y="425541"/>
-            <a:ext cx="720079" cy="525598"/>
-          </a:xfrm>
-          <a:custGeom>
-            <a:avLst/>
-            <a:gdLst>
-              <a:gd name="connsiteX0" fmla="*/ 0 w 615007"/>
-              <a:gd name="connsiteY0" fmla="*/ 0 h 525598"/>
-              <a:gd name="connsiteX1" fmla="*/ 352208 w 615007"/>
-              <a:gd name="connsiteY1" fmla="*/ 0 h 525598"/>
-              <a:gd name="connsiteX2" fmla="*/ 615007 w 615007"/>
-              <a:gd name="connsiteY2" fmla="*/ 262799 h 525598"/>
-              <a:gd name="connsiteX3" fmla="*/ 615006 w 615007"/>
-              <a:gd name="connsiteY3" fmla="*/ 262799 h 525598"/>
-              <a:gd name="connsiteX4" fmla="*/ 352207 w 615007"/>
-              <a:gd name="connsiteY4" fmla="*/ 525598 h 525598"/>
-              <a:gd name="connsiteX5" fmla="*/ 0 w 615007"/>
-              <a:gd name="connsiteY5" fmla="*/ 525598 h 525598"/>
-              <a:gd name="connsiteX6" fmla="*/ 0 w 615007"/>
-              <a:gd name="connsiteY6" fmla="*/ 0 h 525598"/>
-            </a:gdLst>
-            <a:ahLst/>
-            <a:cxnLst>
-              <a:cxn ang="0">
-                <a:pos x="connsiteX0" y="connsiteY0"/>
-              </a:cxn>
-              <a:cxn ang="0">
-                <a:pos x="connsiteX1" y="connsiteY1"/>
-              </a:cxn>
-              <a:cxn ang="0">
-                <a:pos x="connsiteX2" y="connsiteY2"/>
-              </a:cxn>
-              <a:cxn ang="0">
-                <a:pos x="connsiteX3" y="connsiteY3"/>
-              </a:cxn>
-              <a:cxn ang="0">
-                <a:pos x="connsiteX4" y="connsiteY4"/>
-              </a:cxn>
-              <a:cxn ang="0">
-                <a:pos x="connsiteX5" y="connsiteY5"/>
-              </a:cxn>
-              <a:cxn ang="0">
-                <a:pos x="connsiteX6" y="connsiteY6"/>
-              </a:cxn>
-            </a:cxnLst>
-            <a:rect l="l" t="t" r="r" b="b"/>
-            <a:pathLst>
-              <a:path w="615007" h="525598">
-                <a:moveTo>
-                  <a:pt x="0" y="0"/>
-                </a:moveTo>
-                <a:lnTo>
-                  <a:pt x="352208" y="0"/>
-                </a:lnTo>
-                <a:cubicBezTo>
-                  <a:pt x="497348" y="0"/>
-                  <a:pt x="615007" y="117659"/>
-                  <a:pt x="615007" y="262799"/>
-                </a:cubicBezTo>
-                <a:lnTo>
-                  <a:pt x="615006" y="262799"/>
-                </a:lnTo>
-                <a:cubicBezTo>
-                  <a:pt x="615006" y="407939"/>
-                  <a:pt x="497347" y="525598"/>
-                  <a:pt x="352207" y="525598"/>
-                </a:cubicBezTo>
-                <a:lnTo>
-                  <a:pt x="0" y="525598"/>
-                </a:lnTo>
-                <a:lnTo>
-                  <a:pt x="0" y="0"/>
-                </a:lnTo>
-                <a:close/>
-              </a:path>
-            </a:pathLst>
-          </a:custGeom>
-          <a:solidFill>
-            <a:schemeClr val="accent6">
-              <a:lumMod val="50000"/>
-            </a:schemeClr>
-          </a:solidFill>
-          <a:ln>
-            <a:noFill/>
-          </a:ln>
-        </p:spPr>
-        <p:style>
-          <a:lnRef idx="2">
-            <a:schemeClr val="accent1">
-              <a:shade val="50000"/>
-            </a:schemeClr>
-          </a:lnRef>
-          <a:fillRef idx="1">
-            <a:schemeClr val="accent1"/>
-          </a:fillRef>
-          <a:effectRef idx="0">
-            <a:schemeClr val="accent1"/>
-          </a:effectRef>
-          <a:fontRef idx="minor">
-            <a:schemeClr val="lt1"/>
-          </a:fontRef>
-        </p:style>
-        <p:txBody>
-          <a:bodyPr rtlCol="0" anchor="ctr"/>
-          <a:lstStyle/>
-          <a:p>
-            <a:pPr algn="ctr"/>
-            <a:r>
-              <a:rPr lang="en-US" altLang="zh-CN" sz="2800" dirty="0">
-                <a:latin typeface="+mj-lt"/>
-              </a:rPr>
-              <a:t>1.3</a:t>
-            </a:r>
-            <a:endParaRPr lang="zh-CN" altLang="en-US" sz="2800" dirty="0">
-              <a:latin typeface="+mj-lt"/>
-            </a:endParaRPr>
-          </a:p>
-        </p:txBody>
-      </p:sp>
-      <p:sp>
-        <p:nvSpPr>
-          <p:cNvPr id="2" name="文本框 1">
-            <a:extLst>
-              <a:ext uri="{FF2B5EF4-FFF2-40B4-BE49-F238E27FC236}">
-                <a16:creationId xmlns:a16="http://schemas.microsoft.com/office/drawing/2014/main" id="{662425AF-3094-189E-1C87-190D5042D842}"/>
-              </a:ext>
-            </a:extLst>
-          </p:cNvPr>
-          <p:cNvSpPr txBox="1"/>
-          <p:nvPr/>
-        </p:nvSpPr>
-        <p:spPr>
-          <a:xfrm>
-            <a:off x="11656913" y="6381328"/>
-            <a:ext cx="288032" cy="369332"/>
-          </a:xfrm>
-          <a:prstGeom prst="rect">
-            <a:avLst/>
-          </a:prstGeom>
-          <a:noFill/>
-        </p:spPr>
-        <p:txBody>
-          <a:bodyPr wrap="square">
-            <a:spAutoFit/>
-          </a:bodyPr>
-          <a:lstStyle/>
-          <a:p>
-            <a:r>
-              <a:rPr lang="en-US" altLang="zh-CN" sz="1800" b="0" i="0" u="none" strike="noStrike" dirty="0">
-                <a:solidFill>
-                  <a:srgbClr val="1F0909"/>
-                </a:solidFill>
-                <a:effectLst/>
-                <a:latin typeface="PT Serif" panose="020A0603040505020204" pitchFamily="18" charset="0"/>
-              </a:rPr>
-              <a:t>5</a:t>
-            </a:r>
-            <a:endParaRPr lang="zh-CN" altLang="en-US" dirty="0"/>
-          </a:p>
-        </p:txBody>
-      </p:sp>
-      <p:sp>
-        <p:nvSpPr>
-          <p:cNvPr id="8" name="文本框 2">
-            <a:extLst>
-              <a:ext uri="{FF2B5EF4-FFF2-40B4-BE49-F238E27FC236}">
-                <a16:creationId xmlns:a16="http://schemas.microsoft.com/office/drawing/2014/main" id="{1E2A547F-D3C9-DAFB-CBD2-7AF89D434F9B}"/>
-              </a:ext>
-            </a:extLst>
-          </p:cNvPr>
-          <p:cNvSpPr txBox="1"/>
-          <p:nvPr/>
-        </p:nvSpPr>
-        <p:spPr>
-          <a:xfrm>
-            <a:off x="1199456" y="1124744"/>
-            <a:ext cx="10081120" cy="5027017"/>
-          </a:xfrm>
-          <a:prstGeom prst="rect">
-            <a:avLst/>
-          </a:prstGeom>
-          <a:noFill/>
-        </p:spPr>
-        <p:txBody>
-          <a:bodyPr wrap="square">
-            <a:spAutoFit/>
-          </a:bodyPr>
-          <a:lstStyle/>
-          <a:p>
-            <a:pPr marL="285750" indent="-285750">
-              <a:lnSpc>
-                <a:spcPct val="150000"/>
-              </a:lnSpc>
-              <a:buFont typeface="Wingdings" panose="05000000000000000000" pitchFamily="2" charset="2"/>
-              <a:buChar char="l"/>
-            </a:pPr>
-            <a:r>
-              <a:rPr lang="en-US" altLang="zh-CN" spc="100" dirty="0">
-                <a:latin typeface="Arial" panose="020B0604020202020204" pitchFamily="34" charset="0"/>
-                <a:cs typeface="Arial" panose="020B0604020202020204" pitchFamily="34" charset="0"/>
-              </a:rPr>
-              <a:t>High cost:</a:t>
-            </a:r>
-          </a:p>
-          <a:p>
-            <a:pPr marL="742950" lvl="1" indent="-285750">
-              <a:lnSpc>
-                <a:spcPct val="150000"/>
-              </a:lnSpc>
-              <a:buFont typeface="Century Gothic" panose="020B0502020202020204" pitchFamily="34" charset="0"/>
-              <a:buChar char="○"/>
-            </a:pPr>
-            <a:r>
-              <a:rPr lang="en-US" altLang="zh-CN" spc="100" dirty="0">
-                <a:latin typeface="Arial" panose="020B0604020202020204" pitchFamily="34" charset="0"/>
-                <a:ea typeface="Open Sans Light" panose="020B0306030504020204" pitchFamily="34" charset="0"/>
-                <a:cs typeface="Arial" panose="020B0604020202020204" pitchFamily="34" charset="0"/>
-              </a:rPr>
-              <a:t>LiDAR sensors are expensive, particularly high-precision systems, making large-scale commercial deployment a significant economic barrier</a:t>
-            </a:r>
-          </a:p>
-          <a:p>
-            <a:pPr marL="285750" indent="-285750">
-              <a:lnSpc>
-                <a:spcPct val="150000"/>
-              </a:lnSpc>
-              <a:buFont typeface="Wingdings" panose="05000000000000000000" pitchFamily="2" charset="2"/>
-              <a:buChar char="l"/>
-            </a:pPr>
-            <a:r>
-              <a:rPr lang="en-US" altLang="zh-CN" spc="100" dirty="0">
-                <a:latin typeface="Arial" panose="020B0604020202020204" pitchFamily="34" charset="0"/>
-                <a:cs typeface="Arial" panose="020B0604020202020204" pitchFamily="34" charset="0"/>
-              </a:rPr>
-              <a:t>Weather sensitivity</a:t>
-            </a:r>
-          </a:p>
-          <a:p>
-            <a:pPr marL="742950" lvl="1" indent="-285750">
-              <a:lnSpc>
-                <a:spcPct val="150000"/>
-              </a:lnSpc>
-              <a:buFont typeface="Century Gothic" panose="020B0502020202020204" pitchFamily="34" charset="0"/>
-              <a:buChar char="○"/>
-            </a:pPr>
-            <a:r>
-              <a:rPr lang="en-US" altLang="zh-CN" spc="100" dirty="0">
-                <a:latin typeface="Arial" panose="020B0604020202020204" pitchFamily="34" charset="0"/>
-                <a:ea typeface="Open Sans Light" panose="020B0306030504020204" pitchFamily="34" charset="0"/>
-                <a:cs typeface="Arial" panose="020B0604020202020204" pitchFamily="34" charset="0"/>
-              </a:rPr>
-              <a:t>LiDAR is vulnerable to extreme weather conditions (e.g., heavy rain, fog, snow), where laser signals may scatter or reflect, leading to unreliable perception data.</a:t>
-            </a:r>
-          </a:p>
-          <a:p>
-            <a:pPr marL="285750" indent="-285750">
-              <a:lnSpc>
-                <a:spcPct val="150000"/>
-              </a:lnSpc>
-              <a:buFont typeface="Wingdings" panose="05000000000000000000" pitchFamily="2" charset="2"/>
-              <a:buChar char="l"/>
-            </a:pPr>
-            <a:r>
-              <a:rPr lang="en-US" spc="100" dirty="0">
-                <a:latin typeface="Arial" panose="020B0604020202020204" pitchFamily="34" charset="0"/>
-                <a:cs typeface="Arial" panose="020B0604020202020204" pitchFamily="34" charset="0"/>
-              </a:rPr>
-              <a:t>Sensor alignment:</a:t>
-            </a:r>
-          </a:p>
-          <a:p>
-            <a:pPr marL="742950" lvl="1" indent="-285750">
-              <a:lnSpc>
-                <a:spcPct val="150000"/>
-              </a:lnSpc>
-              <a:buFont typeface="Century Gothic" panose="020B0502020202020204" pitchFamily="34" charset="0"/>
-              <a:buChar char="○"/>
-            </a:pPr>
-            <a:r>
-              <a:rPr lang="en-US" spc="100" dirty="0">
-                <a:latin typeface="Arial" panose="020B0604020202020204" pitchFamily="34" charset="0"/>
-                <a:ea typeface="Open Sans Light" panose="020B0306030504020204" pitchFamily="34" charset="0"/>
-                <a:cs typeface="Arial" panose="020B0604020202020204" pitchFamily="34" charset="0"/>
-              </a:rPr>
-              <a:t>Precise alignment for LiDAR and camera data is required, including time and spatial calibration.</a:t>
-            </a:r>
-          </a:p>
-          <a:p>
-            <a:pPr marL="285750" indent="-285750">
-              <a:lnSpc>
-                <a:spcPct val="150000"/>
-              </a:lnSpc>
-              <a:buFont typeface="Wingdings" panose="05000000000000000000" pitchFamily="2" charset="2"/>
-              <a:buChar char="l"/>
-            </a:pPr>
-            <a:r>
-              <a:rPr lang="en-US" altLang="zh-CN" spc="100" dirty="0">
-                <a:latin typeface="Arial" panose="020B0604020202020204" pitchFamily="34" charset="0"/>
-                <a:cs typeface="Arial" panose="020B0604020202020204" pitchFamily="34" charset="0"/>
-              </a:rPr>
-              <a:t>High computational load</a:t>
-            </a:r>
-          </a:p>
-          <a:p>
-            <a:pPr marL="742950" lvl="1" indent="-285750">
-              <a:lnSpc>
-                <a:spcPct val="150000"/>
-              </a:lnSpc>
-              <a:buFont typeface="Century Gothic" panose="020B0502020202020204" pitchFamily="34" charset="0"/>
-              <a:buChar char="○"/>
-            </a:pPr>
-            <a:r>
-              <a:rPr lang="en-US" spc="100" dirty="0">
-                <a:latin typeface="Arial" panose="020B0604020202020204" pitchFamily="34" charset="0"/>
-                <a:ea typeface="Open Sans Light" panose="020B0306030504020204" pitchFamily="34" charset="0"/>
-                <a:cs typeface="Arial" panose="020B0604020202020204" pitchFamily="34" charset="0"/>
-              </a:rPr>
-              <a:t>Multi-sensor fusion increases complexity.</a:t>
-            </a:r>
-          </a:p>
-          <a:p>
-            <a:pPr marL="742950" lvl="1" indent="-285750">
-              <a:lnSpc>
-                <a:spcPct val="150000"/>
-              </a:lnSpc>
-              <a:buFont typeface="Century Gothic" panose="020B0502020202020204" pitchFamily="34" charset="0"/>
-              <a:buChar char="○"/>
-            </a:pPr>
-            <a:r>
-              <a:rPr lang="en-US" spc="100" dirty="0">
-                <a:latin typeface="Arial" panose="020B0604020202020204" pitchFamily="34" charset="0"/>
-                <a:ea typeface="Open Sans Light" panose="020B0306030504020204" pitchFamily="34" charset="0"/>
-                <a:cs typeface="Arial" panose="020B0604020202020204" pitchFamily="34" charset="0"/>
-              </a:rPr>
-              <a:t>Delays in real-time applications.</a:t>
-            </a:r>
-            <a:endParaRPr lang="en-US" altLang="zh-CN" spc="100" dirty="0">
-              <a:latin typeface="Arial" panose="020B0604020202020204" pitchFamily="34" charset="0"/>
-              <a:ea typeface="Open Sans Light" panose="020B0306030504020204" pitchFamily="34" charset="0"/>
-              <a:cs typeface="Arial" panose="020B0604020202020204" pitchFamily="34" charset="0"/>
-            </a:endParaRPr>
-          </a:p>
-        </p:txBody>
-      </p:sp>
-    </p:spTree>
-    <p:extLst>
-      <p:ext uri="{BB962C8B-B14F-4D97-AF65-F5344CB8AC3E}">
-        <p14:creationId xmlns:p14="http://schemas.microsoft.com/office/powerpoint/2010/main" val="832628322"/>
       </p:ext>
     </p:extLst>
   </p:cSld>
@@ -12504,6 +12448,49 @@
               <a:buChar char="l"/>
             </a:pPr>
             <a:r>
+              <a:rPr lang="en-US" b="1" spc="100" dirty="0">
+                <a:latin typeface="Arial" panose="020B0604020202020204" pitchFamily="34" charset="0"/>
+                <a:cs typeface="Arial" panose="020B0604020202020204" pitchFamily="34" charset="0"/>
+              </a:rPr>
+              <a:t>Cost Efficiency </a:t>
+            </a:r>
+            <a:r>
+              <a:rPr lang="en-US" spc="100" dirty="0">
+                <a:latin typeface="Arial" panose="020B0604020202020204" pitchFamily="34" charset="0"/>
+                <a:cs typeface="Arial" panose="020B0604020202020204" pitchFamily="34" charset="0"/>
+              </a:rPr>
+              <a:t>and </a:t>
+            </a:r>
+            <a:r>
+              <a:rPr lang="en-US" b="1" spc="100" dirty="0">
+                <a:latin typeface="Arial" panose="020B0604020202020204" pitchFamily="34" charset="0"/>
+                <a:cs typeface="Arial" panose="020B0604020202020204" pitchFamily="34" charset="0"/>
+              </a:rPr>
+              <a:t>System Efficiency</a:t>
+            </a:r>
+          </a:p>
+          <a:p>
+            <a:pPr marL="285750" indent="-285750">
+              <a:lnSpc>
+                <a:spcPct val="150000"/>
+              </a:lnSpc>
+              <a:buFont typeface="Wingdings" panose="05000000000000000000" pitchFamily="2" charset="2"/>
+              <a:buChar char="l"/>
+            </a:pPr>
+            <a:endParaRPr lang="en-US" spc="100" dirty="0">
+              <a:latin typeface="Arial" panose="020B0604020202020204" pitchFamily="34" charset="0"/>
+              <a:cs typeface="Arial" panose="020B0604020202020204" pitchFamily="34" charset="0"/>
+            </a:endParaRPr>
+          </a:p>
+          <a:p>
+            <a:pPr marL="285750" indent="-285750">
+              <a:lnSpc>
+                <a:spcPct val="150000"/>
+              </a:lnSpc>
+              <a:buFont typeface="Wingdings" panose="05000000000000000000" pitchFamily="2" charset="2"/>
+              <a:buChar char="l"/>
+            </a:pPr>
+            <a:r>
               <a:rPr lang="en-US" spc="100" dirty="0">
                 <a:latin typeface="Arial" panose="020B0604020202020204" pitchFamily="34" charset="0"/>
                 <a:cs typeface="Arial" panose="020B0604020202020204" pitchFamily="34" charset="0"/>
@@ -12567,35 +12554,6 @@
                 <a:cs typeface="Arial" panose="020B0604020202020204" pitchFamily="34" charset="0"/>
               </a:rPr>
               <a:t>Improved Accuracy</a:t>
-            </a:r>
-          </a:p>
-          <a:p>
-            <a:pPr marL="285750" indent="-285750">
-              <a:lnSpc>
-                <a:spcPct val="150000"/>
-              </a:lnSpc>
-              <a:buFont typeface="Wingdings" panose="05000000000000000000" pitchFamily="2" charset="2"/>
-              <a:buChar char="l"/>
-            </a:pPr>
-            <a:endParaRPr lang="en-US" spc="100" dirty="0">
-              <a:latin typeface="Arial" panose="020B0604020202020204" pitchFamily="34" charset="0"/>
-              <a:cs typeface="Arial" panose="020B0604020202020204" pitchFamily="34" charset="0"/>
-            </a:endParaRPr>
-          </a:p>
-          <a:p>
-            <a:pPr marL="285750" indent="-285750">
-              <a:lnSpc>
-                <a:spcPct val="150000"/>
-              </a:lnSpc>
-              <a:buFont typeface="Wingdings" panose="05000000000000000000" pitchFamily="2" charset="2"/>
-              <a:buChar char="l"/>
-            </a:pPr>
-            <a:r>
-              <a:rPr lang="en-US" spc="100" dirty="0">
-                <a:latin typeface="Arial" panose="020B0604020202020204" pitchFamily="34" charset="0"/>
-                <a:cs typeface="Arial" panose="020B0604020202020204" pitchFamily="34" charset="0"/>
-              </a:rPr>
-              <a:t>Cost Efficiency and System Efficiency</a:t>
             </a:r>
           </a:p>
           <a:p>

</xml_diff>

<commit_message>
update pptx 8/10/2024 2nd
</commit_message>
<xml_diff>
--- a/files/proposal.pptx
+++ b/files/proposal.pptx
@@ -6773,7 +6773,7 @@
         <p:spPr>
           <a:xfrm>
             <a:off x="1199456" y="1124744"/>
-            <a:ext cx="10081120" cy="4195957"/>
+            <a:ext cx="10081120" cy="3780458"/>
           </a:xfrm>
           <a:prstGeom prst="rect">
             <a:avLst/>
@@ -6910,20 +6910,15 @@
                 <a:latin typeface="Arial" panose="020B0604020202020204" pitchFamily="34" charset="0"/>
                 <a:cs typeface="Arial" panose="020B0604020202020204" pitchFamily="34" charset="0"/>
               </a:rPr>
-              <a:t>Feature extraction and model fusion.</a:t>
+              <a:t>Feature extraction and model </a:t>
             </a:r>
-            <a:endParaRPr lang="en-US" altLang="zh-CN" spc="100" dirty="0">
-              <a:latin typeface="Arial" panose="020B0604020202020204" pitchFamily="34" charset="0"/>
-              <a:ea typeface="Open Sans Light" panose="020B0306030504020204" pitchFamily="34" charset="0"/>
-              <a:cs typeface="Arial" panose="020B0604020202020204" pitchFamily="34" charset="0"/>
-            </a:endParaRPr>
-          </a:p>
-          <a:p>
-            <a:pPr>
-              <a:lnSpc>
-                <a:spcPct val="150000"/>
-              </a:lnSpc>
-            </a:pPr>
+            <a:r>
+              <a:rPr lang="en-US" altLang="zh-CN" spc="100">
+                <a:latin typeface="Arial" panose="020B0604020202020204" pitchFamily="34" charset="0"/>
+                <a:cs typeface="Arial" panose="020B0604020202020204" pitchFamily="34" charset="0"/>
+              </a:rPr>
+              <a:t>fusion.</a:t>
+            </a:r>
             <a:endParaRPr lang="en-US" altLang="zh-CN" spc="100" dirty="0">
               <a:latin typeface="Arial" panose="020B0604020202020204" pitchFamily="34" charset="0"/>
               <a:cs typeface="Arial" panose="020B0604020202020204" pitchFamily="34" charset="0"/>
@@ -10106,7 +10101,7 @@
                 <a:ea typeface="Open Sans Light" panose="020B0306030504020204" pitchFamily="34" charset="0"/>
                 <a:cs typeface="Arial" panose="020B0604020202020204" pitchFamily="34" charset="0"/>
               </a:rPr>
-              <a:t>LiDAR is vulnerable to extreme weather conditions (e.g., heavy rain, fog, snow), where laser signals may scatter or reflect, leading to unreliable perception data.</a:t>
+              <a:t>LiDAR is affected to extreme weather conditions (e.g., heavy rain, fog, snow), where laser signals may scatter or reflect, leading to unreliable perception data.</a:t>
             </a:r>
           </a:p>
           <a:p>

</xml_diff>

<commit_message>
update pptx 8/10/2024 3rd
</commit_message>
<xml_diff>
--- a/files/proposal.pptx
+++ b/files/proposal.pptx
@@ -6910,19 +6910,8 @@
                 <a:latin typeface="Arial" panose="020B0604020202020204" pitchFamily="34" charset="0"/>
                 <a:cs typeface="Arial" panose="020B0604020202020204" pitchFamily="34" charset="0"/>
               </a:rPr>
-              <a:t>Feature extraction and model </a:t>
+              <a:t>Feature extraction and model fusion.</a:t>
             </a:r>
-            <a:r>
-              <a:rPr lang="en-US" altLang="zh-CN" spc="100">
-                <a:latin typeface="Arial" panose="020B0604020202020204" pitchFamily="34" charset="0"/>
-                <a:cs typeface="Arial" panose="020B0604020202020204" pitchFamily="34" charset="0"/>
-              </a:rPr>
-              <a:t>fusion.</a:t>
-            </a:r>
-            <a:endParaRPr lang="en-US" altLang="zh-CN" spc="100" dirty="0">
-              <a:latin typeface="Arial" panose="020B0604020202020204" pitchFamily="34" charset="0"/>
-              <a:cs typeface="Arial" panose="020B0604020202020204" pitchFamily="34" charset="0"/>
-            </a:endParaRPr>
           </a:p>
           <a:p>
             <a:pPr lvl="1">

</xml_diff>

<commit_message>
update pptx 8/10/2024 5
</commit_message>
<xml_diff>
--- a/files/proposal.pptx
+++ b/files/proposal.pptx
@@ -5382,7 +5382,7 @@
           <p:spPr>
             <a:xfrm>
               <a:off x="6705236" y="4536070"/>
-              <a:ext cx="1566454" cy="523220"/>
+              <a:ext cx="1604927" cy="523220"/>
             </a:xfrm>
             <a:prstGeom prst="rect">
               <a:avLst/>
@@ -5424,7 +5424,7 @@
                   <a:latin typeface="Arial" panose="020B0604020202020204" pitchFamily="34" charset="0"/>
                   <a:cs typeface="Arial" panose="020B0604020202020204" pitchFamily="34" charset="0"/>
                 </a:rPr>
-                <a:t>Meaning</a:t>
+                <a:t>Proposal</a:t>
               </a:r>
               <a:endParaRPr lang="zh-CN" altLang="en-US" dirty="0">
                 <a:solidFill>
@@ -8091,7 +8091,7 @@
           <p:spPr>
             <a:xfrm>
               <a:off x="6705236" y="4536070"/>
-              <a:ext cx="1566454" cy="523220"/>
+              <a:ext cx="1604927" cy="523220"/>
             </a:xfrm>
             <a:prstGeom prst="rect">
               <a:avLst/>
@@ -8133,7 +8133,7 @@
                   <a:latin typeface="Arial" panose="020B0604020202020204" pitchFamily="34" charset="0"/>
                   <a:cs typeface="Arial" panose="020B0604020202020204" pitchFamily="34" charset="0"/>
                 </a:rPr>
-                <a:t>Meaning</a:t>
+                <a:t>Proposal</a:t>
               </a:r>
               <a:endParaRPr lang="zh-CN" altLang="en-US" dirty="0">
                 <a:solidFill>
@@ -11109,7 +11109,7 @@
           <p:spPr>
             <a:xfrm>
               <a:off x="6705236" y="4536070"/>
-              <a:ext cx="1643399" cy="523220"/>
+              <a:ext cx="1721946" cy="523220"/>
             </a:xfrm>
             <a:prstGeom prst="rect">
               <a:avLst/>
@@ -11151,7 +11151,7 @@
                   <a:latin typeface="Arial" panose="020B0604020202020204" pitchFamily="34" charset="0"/>
                   <a:cs typeface="Arial" panose="020B0604020202020204" pitchFamily="34" charset="0"/>
                 </a:rPr>
-                <a:t>Meaning</a:t>
+                <a:t>Proposal</a:t>
               </a:r>
               <a:endParaRPr lang="zh-CN" altLang="en-US" b="1" dirty="0">
                 <a:solidFill>
@@ -13244,7 +13244,7 @@
           <p:spPr>
             <a:xfrm>
               <a:off x="6705236" y="4536070"/>
-              <a:ext cx="1566454" cy="523220"/>
+              <a:ext cx="1604927" cy="523220"/>
             </a:xfrm>
             <a:prstGeom prst="rect">
               <a:avLst/>
@@ -13286,7 +13286,7 @@
                   <a:latin typeface="Arial" panose="020B0604020202020204" pitchFamily="34" charset="0"/>
                   <a:cs typeface="Arial" panose="020B0604020202020204" pitchFamily="34" charset="0"/>
                 </a:rPr>
-                <a:t>Meaning</a:t>
+                <a:t>Proposal</a:t>
               </a:r>
               <a:endParaRPr lang="zh-CN" altLang="en-US" dirty="0">
                 <a:solidFill>

</xml_diff>